<commit_message>
docs : fix pptx
</commit_message>
<xml_diff>
--- a/docs/NPEX-2021-Jaewoong-Sim-Lab1.pptx
+++ b/docs/NPEX-2021-Jaewoong-Sim-Lab1.pptx
@@ -160,8 +160,8 @@
 <p1510:revInfo xmlns:a="http://schemas.openxmlformats.org/drawingml/2006/main" xmlns:r="http://schemas.openxmlformats.org/officeDocument/2006/relationships" xmlns:p1510="http://schemas.microsoft.com/office/powerpoint/2015/10/main">
   <p1510:revLst>
     <p1510:client id="{08DD18F8-AAAA-4FF9-B8A5-42F8B84724DD}" v="10" dt="2021-07-20T07:02:55.138"/>
+    <p1510:client id="{5D9F8D3F-9DB8-460C-9957-8FA5ED188922}" v="25" dt="2021-07-20T14:34:44.587"/>
     <p1510:client id="{749321A6-E320-498A-9ED4-BDE57A7A2E9C}" v="373" dt="2021-07-20T10:24:59.439"/>
-    <p1510:client id="{D90F4C83-37AB-1E40-A4BB-46A25534DE26}" v="229" dt="2020-09-02T13:16:24.549"/>
     <p1510:client id="{DAFA9B3A-AE72-4C46-858D-7B29AF83BAEC}" v="9" dt="2021-07-20T09:17:15.559"/>
     <p1510:client id="{EC43CDFC-3F89-4119-BFFB-BE8987FAC3E7}" v="2" dt="2021-07-20T08:06:17.849"/>
   </p1510:revLst>
@@ -170,6 +170,266 @@
 
 <file path=ppt/changesInfos/changesInfo1.xml><?xml version="1.0" encoding="utf-8"?>
 <pc:chgInfo xmlns:a="http://schemas.openxmlformats.org/drawingml/2006/main" xmlns:r="http://schemas.openxmlformats.org/officeDocument/2006/relationships" xmlns:ac="http://schemas.microsoft.com/office/drawing/2013/main/command" xmlns:pc="http://schemas.microsoft.com/office/powerpoint/2013/main/command">
+  <pc:docChgLst>
+    <pc:chgData name="황보준호" userId="S::joonho0320@seoul.ac.kr::7db17e45-d058-478e-953b-46782bd768d2" providerId="AD" clId="Web-{08DD18F8-AAAA-4FF9-B8A5-42F8B84724DD}"/>
+    <pc:docChg chg="modSld">
+      <pc:chgData name="황보준호" userId="S::joonho0320@seoul.ac.kr::7db17e45-d058-478e-953b-46782bd768d2" providerId="AD" clId="Web-{08DD18F8-AAAA-4FF9-B8A5-42F8B84724DD}" dt="2021-07-20T07:02:55.138" v="6" actId="1076"/>
+      <pc:docMkLst>
+        <pc:docMk/>
+      </pc:docMkLst>
+      <pc:sldChg chg="addSp delSp modSp">
+        <pc:chgData name="황보준호" userId="S::joonho0320@seoul.ac.kr::7db17e45-d058-478e-953b-46782bd768d2" providerId="AD" clId="Web-{08DD18F8-AAAA-4FF9-B8A5-42F8B84724DD}" dt="2021-07-20T07:02:55.138" v="6" actId="1076"/>
+        <pc:sldMkLst>
+          <pc:docMk/>
+          <pc:sldMk cId="3140101267" sldId="330"/>
+        </pc:sldMkLst>
+        <pc:spChg chg="add mod">
+          <ac:chgData name="황보준호" userId="S::joonho0320@seoul.ac.kr::7db17e45-d058-478e-953b-46782bd768d2" providerId="AD" clId="Web-{08DD18F8-AAAA-4FF9-B8A5-42F8B84724DD}" dt="2021-07-20T07:02:55.138" v="6" actId="1076"/>
+          <ac:spMkLst>
+            <pc:docMk/>
+            <pc:sldMk cId="3140101267" sldId="330"/>
+            <ac:spMk id="32" creationId="{608E0613-6A5D-4702-A527-07AF5AFCB9AE}"/>
+          </ac:spMkLst>
+        </pc:spChg>
+        <pc:grpChg chg="del">
+          <ac:chgData name="황보준호" userId="S::joonho0320@seoul.ac.kr::7db17e45-d058-478e-953b-46782bd768d2" providerId="AD" clId="Web-{08DD18F8-AAAA-4FF9-B8A5-42F8B84724DD}" dt="2021-07-20T07:02:17.309" v="0"/>
+          <ac:grpSpMkLst>
+            <pc:docMk/>
+            <pc:sldMk cId="3140101267" sldId="330"/>
+            <ac:grpSpMk id="20" creationId="{92222277-4E26-437E-8479-01D03F893F8C}"/>
+          </ac:grpSpMkLst>
+        </pc:grpChg>
+        <pc:picChg chg="mod topLvl">
+          <ac:chgData name="황보준호" userId="S::joonho0320@seoul.ac.kr::7db17e45-d058-478e-953b-46782bd768d2" providerId="AD" clId="Web-{08DD18F8-AAAA-4FF9-B8A5-42F8B84724DD}" dt="2021-07-20T07:02:40.794" v="2" actId="1076"/>
+          <ac:picMkLst>
+            <pc:docMk/>
+            <pc:sldMk cId="3140101267" sldId="330"/>
+            <ac:picMk id="21" creationId="{53886D34-DF8D-4BDD-9523-644A0AAA5316}"/>
+          </ac:picMkLst>
+        </pc:picChg>
+        <pc:cxnChg chg="topLvl">
+          <ac:chgData name="황보준호" userId="S::joonho0320@seoul.ac.kr::7db17e45-d058-478e-953b-46782bd768d2" providerId="AD" clId="Web-{08DD18F8-AAAA-4FF9-B8A5-42F8B84724DD}" dt="2021-07-20T07:02:17.309" v="0"/>
+          <ac:cxnSpMkLst>
+            <pc:docMk/>
+            <pc:sldMk cId="3140101267" sldId="330"/>
+            <ac:cxnSpMk id="22" creationId="{08AFD219-DE16-4742-897E-5622E482A635}"/>
+          </ac:cxnSpMkLst>
+        </pc:cxnChg>
+        <pc:cxnChg chg="topLvl">
+          <ac:chgData name="황보준호" userId="S::joonho0320@seoul.ac.kr::7db17e45-d058-478e-953b-46782bd768d2" providerId="AD" clId="Web-{08DD18F8-AAAA-4FF9-B8A5-42F8B84724DD}" dt="2021-07-20T07:02:17.309" v="0"/>
+          <ac:cxnSpMkLst>
+            <pc:docMk/>
+            <pc:sldMk cId="3140101267" sldId="330"/>
+            <ac:cxnSpMk id="23" creationId="{E17138CD-C51F-4ED2-A258-C62530EEFAB5}"/>
+          </ac:cxnSpMkLst>
+        </pc:cxnChg>
+        <pc:cxnChg chg="topLvl">
+          <ac:chgData name="황보준호" userId="S::joonho0320@seoul.ac.kr::7db17e45-d058-478e-953b-46782bd768d2" providerId="AD" clId="Web-{08DD18F8-AAAA-4FF9-B8A5-42F8B84724DD}" dt="2021-07-20T07:02:17.309" v="0"/>
+          <ac:cxnSpMkLst>
+            <pc:docMk/>
+            <pc:sldMk cId="3140101267" sldId="330"/>
+            <ac:cxnSpMk id="24" creationId="{8FA04A49-DF9C-4A6C-B039-3D87E4DAA8EE}"/>
+          </ac:cxnSpMkLst>
+        </pc:cxnChg>
+        <pc:cxnChg chg="topLvl">
+          <ac:chgData name="황보준호" userId="S::joonho0320@seoul.ac.kr::7db17e45-d058-478e-953b-46782bd768d2" providerId="AD" clId="Web-{08DD18F8-AAAA-4FF9-B8A5-42F8B84724DD}" dt="2021-07-20T07:02:17.309" v="0"/>
+          <ac:cxnSpMkLst>
+            <pc:docMk/>
+            <pc:sldMk cId="3140101267" sldId="330"/>
+            <ac:cxnSpMk id="25" creationId="{8A2F4503-1C1E-4AEF-9733-D641A4307DED}"/>
+          </ac:cxnSpMkLst>
+        </pc:cxnChg>
+        <pc:cxnChg chg="topLvl">
+          <ac:chgData name="황보준호" userId="S::joonho0320@seoul.ac.kr::7db17e45-d058-478e-953b-46782bd768d2" providerId="AD" clId="Web-{08DD18F8-AAAA-4FF9-B8A5-42F8B84724DD}" dt="2021-07-20T07:02:17.309" v="0"/>
+          <ac:cxnSpMkLst>
+            <pc:docMk/>
+            <pc:sldMk cId="3140101267" sldId="330"/>
+            <ac:cxnSpMk id="26" creationId="{6E93BE64-7E74-47A7-8D38-668259D8E58E}"/>
+          </ac:cxnSpMkLst>
+        </pc:cxnChg>
+        <pc:cxnChg chg="topLvl">
+          <ac:chgData name="황보준호" userId="S::joonho0320@seoul.ac.kr::7db17e45-d058-478e-953b-46782bd768d2" providerId="AD" clId="Web-{08DD18F8-AAAA-4FF9-B8A5-42F8B84724DD}" dt="2021-07-20T07:02:17.309" v="0"/>
+          <ac:cxnSpMkLst>
+            <pc:docMk/>
+            <pc:sldMk cId="3140101267" sldId="330"/>
+            <ac:cxnSpMk id="27" creationId="{F152F43E-4708-4397-A14C-221015F126E4}"/>
+          </ac:cxnSpMkLst>
+        </pc:cxnChg>
+      </pc:sldChg>
+    </pc:docChg>
+  </pc:docChgLst>
+  <pc:docChgLst>
+    <pc:chgData name="심재웅" userId="S::jaewoong@seoul.ac.kr::96dca5ff-9fe9-4d6b-900a-c47444e5142c" providerId="AD" clId="Web-{5D9F8D3F-9DB8-460C-9957-8FA5ED188922}"/>
+    <pc:docChg chg="modSld">
+      <pc:chgData name="심재웅" userId="S::jaewoong@seoul.ac.kr::96dca5ff-9fe9-4d6b-900a-c47444e5142c" providerId="AD" clId="Web-{5D9F8D3F-9DB8-460C-9957-8FA5ED188922}" dt="2021-07-20T14:34:34.164" v="13" actId="20577"/>
+      <pc:docMkLst>
+        <pc:docMk/>
+      </pc:docMkLst>
+      <pc:sldChg chg="modSp">
+        <pc:chgData name="심재웅" userId="S::jaewoong@seoul.ac.kr::96dca5ff-9fe9-4d6b-900a-c47444e5142c" providerId="AD" clId="Web-{5D9F8D3F-9DB8-460C-9957-8FA5ED188922}" dt="2021-07-20T14:34:16.617" v="7" actId="20577"/>
+        <pc:sldMkLst>
+          <pc:docMk/>
+          <pc:sldMk cId="1903278140" sldId="256"/>
+        </pc:sldMkLst>
+        <pc:spChg chg="mod">
+          <ac:chgData name="심재웅" userId="S::jaewoong@seoul.ac.kr::96dca5ff-9fe9-4d6b-900a-c47444e5142c" providerId="AD" clId="Web-{5D9F8D3F-9DB8-460C-9957-8FA5ED188922}" dt="2021-07-20T14:34:16.617" v="7" actId="20577"/>
+          <ac:spMkLst>
+            <pc:docMk/>
+            <pc:sldMk cId="1903278140" sldId="256"/>
+            <ac:spMk id="2" creationId="{00000000-0000-0000-0000-000000000000}"/>
+          </ac:spMkLst>
+        </pc:spChg>
+      </pc:sldChg>
+      <pc:sldChg chg="modSp">
+        <pc:chgData name="심재웅" userId="S::jaewoong@seoul.ac.kr::96dca5ff-9fe9-4d6b-900a-c47444e5142c" providerId="AD" clId="Web-{5D9F8D3F-9DB8-460C-9957-8FA5ED188922}" dt="2021-07-20T14:34:21.695" v="11" actId="20577"/>
+        <pc:sldMkLst>
+          <pc:docMk/>
+          <pc:sldMk cId="1481437935" sldId="293"/>
+        </pc:sldMkLst>
+        <pc:spChg chg="mod">
+          <ac:chgData name="심재웅" userId="S::jaewoong@seoul.ac.kr::96dca5ff-9fe9-4d6b-900a-c47444e5142c" providerId="AD" clId="Web-{5D9F8D3F-9DB8-460C-9957-8FA5ED188922}" dt="2021-07-20T14:34:20.164" v="8" actId="20577"/>
+          <ac:spMkLst>
+            <pc:docMk/>
+            <pc:sldMk cId="1481437935" sldId="293"/>
+            <ac:spMk id="2" creationId="{2EE47C68-5CCC-8B43-9F15-4A7521A5BB51}"/>
+          </ac:spMkLst>
+        </pc:spChg>
+        <pc:spChg chg="mod">
+          <ac:chgData name="심재웅" userId="S::jaewoong@seoul.ac.kr::96dca5ff-9fe9-4d6b-900a-c47444e5142c" providerId="AD" clId="Web-{5D9F8D3F-9DB8-460C-9957-8FA5ED188922}" dt="2021-07-20T14:34:21.695" v="11" actId="20577"/>
+          <ac:spMkLst>
+            <pc:docMk/>
+            <pc:sldMk cId="1481437935" sldId="293"/>
+            <ac:spMk id="3" creationId="{87078094-BCBE-E74B-8943-0EF7834D89F0}"/>
+          </ac:spMkLst>
+        </pc:spChg>
+      </pc:sldChg>
+      <pc:sldChg chg="modSp">
+        <pc:chgData name="심재웅" userId="S::jaewoong@seoul.ac.kr::96dca5ff-9fe9-4d6b-900a-c47444e5142c" providerId="AD" clId="Web-{5D9F8D3F-9DB8-460C-9957-8FA5ED188922}" dt="2021-07-20T14:34:34.164" v="13" actId="20577"/>
+        <pc:sldMkLst>
+          <pc:docMk/>
+          <pc:sldMk cId="1931055097" sldId="332"/>
+        </pc:sldMkLst>
+        <pc:spChg chg="mod">
+          <ac:chgData name="심재웅" userId="S::jaewoong@seoul.ac.kr::96dca5ff-9fe9-4d6b-900a-c47444e5142c" providerId="AD" clId="Web-{5D9F8D3F-9DB8-460C-9957-8FA5ED188922}" dt="2021-07-20T14:34:34.164" v="13" actId="20577"/>
+          <ac:spMkLst>
+            <pc:docMk/>
+            <pc:sldMk cId="1931055097" sldId="332"/>
+            <ac:spMk id="3" creationId="{3A033D0B-87DB-B843-B296-41DDA4871FF1}"/>
+          </ac:spMkLst>
+        </pc:spChg>
+      </pc:sldChg>
+    </pc:docChg>
+  </pc:docChgLst>
+  <pc:docChgLst>
+    <pc:chgData name="심재웅" userId="96dca5ff-9fe9-4d6b-900a-c47444e5142c" providerId="ADAL" clId="{95767ABC-2FFA-644C-BD1D-440E6B55C83D}"/>
+    <pc:docChg chg="undo custSel modSld">
+      <pc:chgData name="심재웅" userId="96dca5ff-9fe9-4d6b-900a-c47444e5142c" providerId="ADAL" clId="{95767ABC-2FFA-644C-BD1D-440E6B55C83D}" dt="2021-07-20T14:49:00.717" v="26" actId="478"/>
+      <pc:docMkLst>
+        <pc:docMk/>
+      </pc:docMkLst>
+      <pc:sldChg chg="modSp mod">
+        <pc:chgData name="심재웅" userId="96dca5ff-9fe9-4d6b-900a-c47444e5142c" providerId="ADAL" clId="{95767ABC-2FFA-644C-BD1D-440E6B55C83D}" dt="2021-07-20T14:48:14.607" v="17" actId="20577"/>
+        <pc:sldMkLst>
+          <pc:docMk/>
+          <pc:sldMk cId="1481437935" sldId="293"/>
+        </pc:sldMkLst>
+        <pc:spChg chg="mod">
+          <ac:chgData name="심재웅" userId="96dca5ff-9fe9-4d6b-900a-c47444e5142c" providerId="ADAL" clId="{95767ABC-2FFA-644C-BD1D-440E6B55C83D}" dt="2021-07-20T14:47:49.961" v="4" actId="20577"/>
+          <ac:spMkLst>
+            <pc:docMk/>
+            <pc:sldMk cId="1481437935" sldId="293"/>
+            <ac:spMk id="2" creationId="{2EE47C68-5CCC-8B43-9F15-4A7521A5BB51}"/>
+          </ac:spMkLst>
+        </pc:spChg>
+        <pc:spChg chg="mod">
+          <ac:chgData name="심재웅" userId="96dca5ff-9fe9-4d6b-900a-c47444e5142c" providerId="ADAL" clId="{95767ABC-2FFA-644C-BD1D-440E6B55C83D}" dt="2021-07-20T14:48:14.607" v="17" actId="20577"/>
+          <ac:spMkLst>
+            <pc:docMk/>
+            <pc:sldMk cId="1481437935" sldId="293"/>
+            <ac:spMk id="3" creationId="{87078094-BCBE-E74B-8943-0EF7834D89F0}"/>
+          </ac:spMkLst>
+        </pc:spChg>
+      </pc:sldChg>
+      <pc:sldChg chg="modSp mod">
+        <pc:chgData name="심재웅" userId="96dca5ff-9fe9-4d6b-900a-c47444e5142c" providerId="ADAL" clId="{95767ABC-2FFA-644C-BD1D-440E6B55C83D}" dt="2021-07-20T14:48:44.472" v="25" actId="20577"/>
+        <pc:sldMkLst>
+          <pc:docMk/>
+          <pc:sldMk cId="2410604289" sldId="306"/>
+        </pc:sldMkLst>
+        <pc:spChg chg="mod">
+          <ac:chgData name="심재웅" userId="96dca5ff-9fe9-4d6b-900a-c47444e5142c" providerId="ADAL" clId="{95767ABC-2FFA-644C-BD1D-440E6B55C83D}" dt="2021-07-20T14:48:44.472" v="25" actId="20577"/>
+          <ac:spMkLst>
+            <pc:docMk/>
+            <pc:sldMk cId="2410604289" sldId="306"/>
+            <ac:spMk id="3" creationId="{A55FD3F7-C5A2-B548-A8C4-B085823ADE83}"/>
+          </ac:spMkLst>
+        </pc:spChg>
+      </pc:sldChg>
+      <pc:sldChg chg="delSp mod">
+        <pc:chgData name="심재웅" userId="96dca5ff-9fe9-4d6b-900a-c47444e5142c" providerId="ADAL" clId="{95767ABC-2FFA-644C-BD1D-440E6B55C83D}" dt="2021-07-20T14:49:00.717" v="26" actId="478"/>
+        <pc:sldMkLst>
+          <pc:docMk/>
+          <pc:sldMk cId="3140101267" sldId="330"/>
+        </pc:sldMkLst>
+        <pc:spChg chg="del">
+          <ac:chgData name="심재웅" userId="96dca5ff-9fe9-4d6b-900a-c47444e5142c" providerId="ADAL" clId="{95767ABC-2FFA-644C-BD1D-440E6B55C83D}" dt="2021-07-20T14:49:00.717" v="26" actId="478"/>
+          <ac:spMkLst>
+            <pc:docMk/>
+            <pc:sldMk cId="3140101267" sldId="330"/>
+            <ac:spMk id="32" creationId="{608E0613-6A5D-4702-A527-07AF5AFCB9AE}"/>
+          </ac:spMkLst>
+        </pc:spChg>
+      </pc:sldChg>
+    </pc:docChg>
+  </pc:docChgLst>
+  <pc:docChgLst>
+    <pc:chgData name="황보준호" userId="S::joonho0320@seoul.ac.kr::7db17e45-d058-478e-953b-46782bd768d2" providerId="AD" clId="Web-{EC43CDFC-3F89-4119-BFFB-BE8987FAC3E7}"/>
+    <pc:docChg chg="modSld">
+      <pc:chgData name="황보준호" userId="S::joonho0320@seoul.ac.kr::7db17e45-d058-478e-953b-46782bd768d2" providerId="AD" clId="Web-{EC43CDFC-3F89-4119-BFFB-BE8987FAC3E7}" dt="2021-07-20T08:06:17.849" v="1"/>
+      <pc:docMkLst>
+        <pc:docMk/>
+      </pc:docMkLst>
+      <pc:sldChg chg="addSp delSp">
+        <pc:chgData name="황보준호" userId="S::joonho0320@seoul.ac.kr::7db17e45-d058-478e-953b-46782bd768d2" providerId="AD" clId="Web-{EC43CDFC-3F89-4119-BFFB-BE8987FAC3E7}" dt="2021-07-20T08:06:17.849" v="1"/>
+        <pc:sldMkLst>
+          <pc:docMk/>
+          <pc:sldMk cId="1903278140" sldId="256"/>
+        </pc:sldMkLst>
+        <pc:spChg chg="add del">
+          <ac:chgData name="황보준호" userId="S::joonho0320@seoul.ac.kr::7db17e45-d058-478e-953b-46782bd768d2" providerId="AD" clId="Web-{EC43CDFC-3F89-4119-BFFB-BE8987FAC3E7}" dt="2021-07-20T08:06:17.849" v="1"/>
+          <ac:spMkLst>
+            <pc:docMk/>
+            <pc:sldMk cId="1903278140" sldId="256"/>
+            <ac:spMk id="3" creationId="{30D292A8-72F3-46B0-BC6D-CE731A2BAD68}"/>
+          </ac:spMkLst>
+        </pc:spChg>
+      </pc:sldChg>
+    </pc:docChg>
+  </pc:docChgLst>
+  <pc:docChgLst>
+    <pc:chgData name="이준서" userId="S::pjsbeauty@seoul.ac.kr::7a0e86a5-1ce5-494d-a5a5-0f82551f45ef" providerId="AD" clId="Web-{DAFA9B3A-AE72-4C46-858D-7B29AF83BAEC}"/>
+    <pc:docChg chg="modSld">
+      <pc:chgData name="이준서" userId="S::pjsbeauty@seoul.ac.kr::7a0e86a5-1ce5-494d-a5a5-0f82551f45ef" providerId="AD" clId="Web-{DAFA9B3A-AE72-4C46-858D-7B29AF83BAEC}" dt="2021-07-20T09:17:12.981" v="3" actId="20577"/>
+      <pc:docMkLst>
+        <pc:docMk/>
+      </pc:docMkLst>
+      <pc:sldChg chg="modSp">
+        <pc:chgData name="이준서" userId="S::pjsbeauty@seoul.ac.kr::7a0e86a5-1ce5-494d-a5a5-0f82551f45ef" providerId="AD" clId="Web-{DAFA9B3A-AE72-4C46-858D-7B29AF83BAEC}" dt="2021-07-20T09:17:12.981" v="3" actId="20577"/>
+        <pc:sldMkLst>
+          <pc:docMk/>
+          <pc:sldMk cId="3084826439" sldId="344"/>
+        </pc:sldMkLst>
+        <pc:spChg chg="mod">
+          <ac:chgData name="이준서" userId="S::pjsbeauty@seoul.ac.kr::7a0e86a5-1ce5-494d-a5a5-0f82551f45ef" providerId="AD" clId="Web-{DAFA9B3A-AE72-4C46-858D-7B29AF83BAEC}" dt="2021-07-20T09:17:12.981" v="3" actId="20577"/>
+          <ac:spMkLst>
+            <pc:docMk/>
+            <pc:sldMk cId="3084826439" sldId="344"/>
+            <ac:spMk id="3" creationId="{A55FD3F7-C5A2-B548-A8C4-B085823ADE83}"/>
+          </ac:spMkLst>
+        </pc:spChg>
+      </pc:sldChg>
+    </pc:docChg>
+  </pc:docChgLst>
   <pc:docChgLst>
     <pc:chgData name="Jaewoong Sim" userId="794c201930605eba" providerId="LiveId" clId="{D90F4C83-37AB-1E40-A4BB-46A25534DE26}"/>
     <pc:docChg chg="undo redo custSel addSld delSld modSld modMainMaster">
@@ -1840,94 +2100,6 @@
     </pc:docChg>
   </pc:docChgLst>
   <pc:docChgLst>
-    <pc:chgData name="황보준호" userId="S::joonho0320@seoul.ac.kr::7db17e45-d058-478e-953b-46782bd768d2" providerId="AD" clId="Web-{08DD18F8-AAAA-4FF9-B8A5-42F8B84724DD}"/>
-    <pc:docChg chg="modSld">
-      <pc:chgData name="황보준호" userId="S::joonho0320@seoul.ac.kr::7db17e45-d058-478e-953b-46782bd768d2" providerId="AD" clId="Web-{08DD18F8-AAAA-4FF9-B8A5-42F8B84724DD}" dt="2021-07-20T07:02:55.138" v="6" actId="1076"/>
-      <pc:docMkLst>
-        <pc:docMk/>
-      </pc:docMkLst>
-      <pc:sldChg chg="addSp delSp modSp">
-        <pc:chgData name="황보준호" userId="S::joonho0320@seoul.ac.kr::7db17e45-d058-478e-953b-46782bd768d2" providerId="AD" clId="Web-{08DD18F8-AAAA-4FF9-B8A5-42F8B84724DD}" dt="2021-07-20T07:02:55.138" v="6" actId="1076"/>
-        <pc:sldMkLst>
-          <pc:docMk/>
-          <pc:sldMk cId="3140101267" sldId="330"/>
-        </pc:sldMkLst>
-        <pc:spChg chg="add mod">
-          <ac:chgData name="황보준호" userId="S::joonho0320@seoul.ac.kr::7db17e45-d058-478e-953b-46782bd768d2" providerId="AD" clId="Web-{08DD18F8-AAAA-4FF9-B8A5-42F8B84724DD}" dt="2021-07-20T07:02:55.138" v="6" actId="1076"/>
-          <ac:spMkLst>
-            <pc:docMk/>
-            <pc:sldMk cId="3140101267" sldId="330"/>
-            <ac:spMk id="32" creationId="{608E0613-6A5D-4702-A527-07AF5AFCB9AE}"/>
-          </ac:spMkLst>
-        </pc:spChg>
-        <pc:grpChg chg="del">
-          <ac:chgData name="황보준호" userId="S::joonho0320@seoul.ac.kr::7db17e45-d058-478e-953b-46782bd768d2" providerId="AD" clId="Web-{08DD18F8-AAAA-4FF9-B8A5-42F8B84724DD}" dt="2021-07-20T07:02:17.309" v="0"/>
-          <ac:grpSpMkLst>
-            <pc:docMk/>
-            <pc:sldMk cId="3140101267" sldId="330"/>
-            <ac:grpSpMk id="20" creationId="{92222277-4E26-437E-8479-01D03F893F8C}"/>
-          </ac:grpSpMkLst>
-        </pc:grpChg>
-        <pc:picChg chg="mod topLvl">
-          <ac:chgData name="황보준호" userId="S::joonho0320@seoul.ac.kr::7db17e45-d058-478e-953b-46782bd768d2" providerId="AD" clId="Web-{08DD18F8-AAAA-4FF9-B8A5-42F8B84724DD}" dt="2021-07-20T07:02:40.794" v="2" actId="1076"/>
-          <ac:picMkLst>
-            <pc:docMk/>
-            <pc:sldMk cId="3140101267" sldId="330"/>
-            <ac:picMk id="21" creationId="{53886D34-DF8D-4BDD-9523-644A0AAA5316}"/>
-          </ac:picMkLst>
-        </pc:picChg>
-        <pc:cxnChg chg="topLvl">
-          <ac:chgData name="황보준호" userId="S::joonho0320@seoul.ac.kr::7db17e45-d058-478e-953b-46782bd768d2" providerId="AD" clId="Web-{08DD18F8-AAAA-4FF9-B8A5-42F8B84724DD}" dt="2021-07-20T07:02:17.309" v="0"/>
-          <ac:cxnSpMkLst>
-            <pc:docMk/>
-            <pc:sldMk cId="3140101267" sldId="330"/>
-            <ac:cxnSpMk id="22" creationId="{08AFD219-DE16-4742-897E-5622E482A635}"/>
-          </ac:cxnSpMkLst>
-        </pc:cxnChg>
-        <pc:cxnChg chg="topLvl">
-          <ac:chgData name="황보준호" userId="S::joonho0320@seoul.ac.kr::7db17e45-d058-478e-953b-46782bd768d2" providerId="AD" clId="Web-{08DD18F8-AAAA-4FF9-B8A5-42F8B84724DD}" dt="2021-07-20T07:02:17.309" v="0"/>
-          <ac:cxnSpMkLst>
-            <pc:docMk/>
-            <pc:sldMk cId="3140101267" sldId="330"/>
-            <ac:cxnSpMk id="23" creationId="{E17138CD-C51F-4ED2-A258-C62530EEFAB5}"/>
-          </ac:cxnSpMkLst>
-        </pc:cxnChg>
-        <pc:cxnChg chg="topLvl">
-          <ac:chgData name="황보준호" userId="S::joonho0320@seoul.ac.kr::7db17e45-d058-478e-953b-46782bd768d2" providerId="AD" clId="Web-{08DD18F8-AAAA-4FF9-B8A5-42F8B84724DD}" dt="2021-07-20T07:02:17.309" v="0"/>
-          <ac:cxnSpMkLst>
-            <pc:docMk/>
-            <pc:sldMk cId="3140101267" sldId="330"/>
-            <ac:cxnSpMk id="24" creationId="{8FA04A49-DF9C-4A6C-B039-3D87E4DAA8EE}"/>
-          </ac:cxnSpMkLst>
-        </pc:cxnChg>
-        <pc:cxnChg chg="topLvl">
-          <ac:chgData name="황보준호" userId="S::joonho0320@seoul.ac.kr::7db17e45-d058-478e-953b-46782bd768d2" providerId="AD" clId="Web-{08DD18F8-AAAA-4FF9-B8A5-42F8B84724DD}" dt="2021-07-20T07:02:17.309" v="0"/>
-          <ac:cxnSpMkLst>
-            <pc:docMk/>
-            <pc:sldMk cId="3140101267" sldId="330"/>
-            <ac:cxnSpMk id="25" creationId="{8A2F4503-1C1E-4AEF-9733-D641A4307DED}"/>
-          </ac:cxnSpMkLst>
-        </pc:cxnChg>
-        <pc:cxnChg chg="topLvl">
-          <ac:chgData name="황보준호" userId="S::joonho0320@seoul.ac.kr::7db17e45-d058-478e-953b-46782bd768d2" providerId="AD" clId="Web-{08DD18F8-AAAA-4FF9-B8A5-42F8B84724DD}" dt="2021-07-20T07:02:17.309" v="0"/>
-          <ac:cxnSpMkLst>
-            <pc:docMk/>
-            <pc:sldMk cId="3140101267" sldId="330"/>
-            <ac:cxnSpMk id="26" creationId="{6E93BE64-7E74-47A7-8D38-668259D8E58E}"/>
-          </ac:cxnSpMkLst>
-        </pc:cxnChg>
-        <pc:cxnChg chg="topLvl">
-          <ac:chgData name="황보준호" userId="S::joonho0320@seoul.ac.kr::7db17e45-d058-478e-953b-46782bd768d2" providerId="AD" clId="Web-{08DD18F8-AAAA-4FF9-B8A5-42F8B84724DD}" dt="2021-07-20T07:02:17.309" v="0"/>
-          <ac:cxnSpMkLst>
-            <pc:docMk/>
-            <pc:sldMk cId="3140101267" sldId="330"/>
-            <ac:cxnSpMk id="27" creationId="{F152F43E-4708-4397-A14C-221015F126E4}"/>
-          </ac:cxnSpMkLst>
-        </pc:cxnChg>
-      </pc:sldChg>
-    </pc:docChg>
-  </pc:docChgLst>
-  <pc:docChgLst>
     <pc:chgData name="이준서" userId="S::pjsbeauty@seoul.ac.kr::7a0e86a5-1ce5-494d-a5a5-0f82551f45ef" providerId="AD" clId="Web-{749321A6-E320-498A-9ED4-BDE57A7A2E9C}"/>
     <pc:docChg chg="addSld modSld">
       <pc:chgData name="이준서" userId="S::pjsbeauty@seoul.ac.kr::7a0e86a5-1ce5-494d-a5a5-0f82551f45ef" providerId="AD" clId="Web-{749321A6-E320-498A-9ED4-BDE57A7A2E9C}" dt="2021-07-20T10:24:59.439" v="192" actId="20577"/>
@@ -2006,54 +2178,6 @@
       </pc:sldChg>
     </pc:docChg>
   </pc:docChgLst>
-  <pc:docChgLst>
-    <pc:chgData name="황보준호" userId="S::joonho0320@seoul.ac.kr::7db17e45-d058-478e-953b-46782bd768d2" providerId="AD" clId="Web-{EC43CDFC-3F89-4119-BFFB-BE8987FAC3E7}"/>
-    <pc:docChg chg="modSld">
-      <pc:chgData name="황보준호" userId="S::joonho0320@seoul.ac.kr::7db17e45-d058-478e-953b-46782bd768d2" providerId="AD" clId="Web-{EC43CDFC-3F89-4119-BFFB-BE8987FAC3E7}" dt="2021-07-20T08:06:17.849" v="1"/>
-      <pc:docMkLst>
-        <pc:docMk/>
-      </pc:docMkLst>
-      <pc:sldChg chg="addSp delSp">
-        <pc:chgData name="황보준호" userId="S::joonho0320@seoul.ac.kr::7db17e45-d058-478e-953b-46782bd768d2" providerId="AD" clId="Web-{EC43CDFC-3F89-4119-BFFB-BE8987FAC3E7}" dt="2021-07-20T08:06:17.849" v="1"/>
-        <pc:sldMkLst>
-          <pc:docMk/>
-          <pc:sldMk cId="1903278140" sldId="256"/>
-        </pc:sldMkLst>
-        <pc:spChg chg="add del">
-          <ac:chgData name="황보준호" userId="S::joonho0320@seoul.ac.kr::7db17e45-d058-478e-953b-46782bd768d2" providerId="AD" clId="Web-{EC43CDFC-3F89-4119-BFFB-BE8987FAC3E7}" dt="2021-07-20T08:06:17.849" v="1"/>
-          <ac:spMkLst>
-            <pc:docMk/>
-            <pc:sldMk cId="1903278140" sldId="256"/>
-            <ac:spMk id="3" creationId="{30D292A8-72F3-46B0-BC6D-CE731A2BAD68}"/>
-          </ac:spMkLst>
-        </pc:spChg>
-      </pc:sldChg>
-    </pc:docChg>
-  </pc:docChgLst>
-  <pc:docChgLst>
-    <pc:chgData name="이준서" userId="S::pjsbeauty@seoul.ac.kr::7a0e86a5-1ce5-494d-a5a5-0f82551f45ef" providerId="AD" clId="Web-{DAFA9B3A-AE72-4C46-858D-7B29AF83BAEC}"/>
-    <pc:docChg chg="modSld">
-      <pc:chgData name="이준서" userId="S::pjsbeauty@seoul.ac.kr::7a0e86a5-1ce5-494d-a5a5-0f82551f45ef" providerId="AD" clId="Web-{DAFA9B3A-AE72-4C46-858D-7B29AF83BAEC}" dt="2021-07-20T09:17:12.981" v="3" actId="20577"/>
-      <pc:docMkLst>
-        <pc:docMk/>
-      </pc:docMkLst>
-      <pc:sldChg chg="modSp">
-        <pc:chgData name="이준서" userId="S::pjsbeauty@seoul.ac.kr::7a0e86a5-1ce5-494d-a5a5-0f82551f45ef" providerId="AD" clId="Web-{DAFA9B3A-AE72-4C46-858D-7B29AF83BAEC}" dt="2021-07-20T09:17:12.981" v="3" actId="20577"/>
-        <pc:sldMkLst>
-          <pc:docMk/>
-          <pc:sldMk cId="3084826439" sldId="344"/>
-        </pc:sldMkLst>
-        <pc:spChg chg="mod">
-          <ac:chgData name="이준서" userId="S::pjsbeauty@seoul.ac.kr::7a0e86a5-1ce5-494d-a5a5-0f82551f45ef" providerId="AD" clId="Web-{DAFA9B3A-AE72-4C46-858D-7B29AF83BAEC}" dt="2021-07-20T09:17:12.981" v="3" actId="20577"/>
-          <ac:spMkLst>
-            <pc:docMk/>
-            <pc:sldMk cId="3084826439" sldId="344"/>
-            <ac:spMk id="3" creationId="{A55FD3F7-C5A2-B548-A8C4-B085823ADE83}"/>
-          </ac:spMkLst>
-        </pc:spChg>
-      </pc:sldChg>
-    </pc:docChg>
-  </pc:docChgLst>
 </pc:chgInfo>
 </file>
 
@@ -2139,7 +2263,7 @@
           <a:p>
             <a:fld id="{BCB5BC45-66ED-47E2-893A-D3BABCDC3A5A}" type="datetimeFigureOut">
               <a:rPr lang="en-US" smtClean="0"/>
-              <a:t>7/21/21</a:t>
+              <a:t>7/20/21</a:t>
             </a:fld>
             <a:endParaRPr lang="en-US"/>
           </a:p>
@@ -2304,7 +2428,7 @@
           <a:p>
             <a:fld id="{061F0A6E-7066-444F-9154-C920A97B19B6}" type="datetimeFigureOut">
               <a:rPr lang="en-US" smtClean="0"/>
-              <a:t>7/21/21</a:t>
+              <a:t>7/20/21</a:t>
             </a:fld>
             <a:endParaRPr lang="en-US"/>
           </a:p>
@@ -4730,7 +4854,7 @@
           </a:xfrm>
         </p:spPr>
         <p:txBody>
-          <a:bodyPr>
+          <a:bodyPr vert="horz" lIns="91440" tIns="45720" rIns="91440" bIns="45720" anchor="t" anchorCtr="0">
             <a:noAutofit/>
           </a:bodyPr>
           <a:lstStyle/>
@@ -4748,6 +4872,9 @@
                     <a:lumOff val="25000"/>
                   </a:schemeClr>
                 </a:solidFill>
+                <a:latin typeface="Calibri"/>
+                <a:ea typeface="Tahoma"/>
+                <a:cs typeface="Calibri"/>
               </a:rPr>
               <a:t>SNU-Samsung AI (NPEX)</a:t>
             </a:r>
@@ -4757,12 +4884,6 @@
                   <a:noFill/>
                   <a:prstDash val="solid"/>
                 </a:ln>
-                <a:solidFill>
-                  <a:schemeClr val="tx1">
-                    <a:lumMod val="75000"/>
-                    <a:lumOff val="25000"/>
-                  </a:schemeClr>
-                </a:solidFill>
               </a:rPr>
             </a:br>
             <a:r>
@@ -4777,6 +4898,9 @@
                     <a:lumOff val="25000"/>
                   </a:schemeClr>
                 </a:solidFill>
+                <a:latin typeface="Calibri"/>
+                <a:ea typeface="Tahoma"/>
+                <a:cs typeface="Calibri"/>
               </a:rPr>
               <a:t>Lab 1: Verilog 101 - Register File Design</a:t>
             </a:r>
@@ -4791,12 +4915,6 @@
                   </a:solidFill>
                   <a:prstDash val="solid"/>
                 </a:ln>
-                <a:solidFill>
-                  <a:schemeClr val="tx1">
-                    <a:lumMod val="75000"/>
-                    <a:lumOff val="25000"/>
-                  </a:schemeClr>
-                </a:solidFill>
               </a:rPr>
             </a:br>
             <a:br>
@@ -4810,29 +4928,8 @@
                   </a:solidFill>
                   <a:prstDash val="solid"/>
                 </a:ln>
-                <a:solidFill>
-                  <a:schemeClr val="tx1">
-                    <a:lumMod val="75000"/>
-                    <a:lumOff val="25000"/>
-                  </a:schemeClr>
-                </a:solidFill>
               </a:rPr>
             </a:br>
-            <a:r>
-              <a:rPr lang="en-US" sz="2000" dirty="0" err="1">
-                <a:ln w="9000" cmpd="sng">
-                  <a:noFill/>
-                  <a:prstDash val="solid"/>
-                </a:ln>
-                <a:solidFill>
-                  <a:schemeClr val="tx1">
-                    <a:lumMod val="75000"/>
-                    <a:lumOff val="25000"/>
-                  </a:schemeClr>
-                </a:solidFill>
-              </a:rPr>
-              <a:t>Jaewoong</a:t>
-            </a:r>
             <a:r>
               <a:rPr lang="en-US" sz="2000" dirty="0">
                 <a:ln w="9000" cmpd="sng">
@@ -4845,8 +4942,11 @@
                     <a:lumOff val="25000"/>
                   </a:schemeClr>
                 </a:solidFill>
-              </a:rPr>
-              <a:t> Sim</a:t>
+                <a:latin typeface="Calibri"/>
+                <a:ea typeface="Tahoma"/>
+                <a:cs typeface="Calibri"/>
+              </a:rPr>
+              <a:t>Junseo Lee (TA) </a:t>
             </a:r>
             <a:br>
               <a:rPr lang="en-US" sz="2000" dirty="0">
@@ -4859,12 +4959,6 @@
                   </a:solidFill>
                   <a:prstDash val="solid"/>
                 </a:ln>
-                <a:solidFill>
-                  <a:schemeClr val="tx1">
-                    <a:lumMod val="75000"/>
-                    <a:lumOff val="25000"/>
-                  </a:schemeClr>
-                </a:solidFill>
               </a:rPr>
             </a:br>
             <a:r>
@@ -4876,6 +4970,9 @@
                 <a:solidFill>
                   <a:schemeClr val="accent2"/>
                 </a:solidFill>
+                <a:latin typeface="Calibri"/>
+                <a:ea typeface="Tahoma"/>
+                <a:cs typeface="Calibri"/>
               </a:rPr>
               <a:t>Seoul National University</a:t>
             </a:r>
@@ -4887,9 +4984,6 @@
                   </a:solidFill>
                   <a:prstDash val="solid"/>
                 </a:ln>
-                <a:solidFill>
-                  <a:schemeClr val="accent2"/>
-                </a:solidFill>
               </a:rPr>
             </a:br>
             <a:br>
@@ -4900,9 +4994,6 @@
                   </a:solidFill>
                   <a:prstDash val="solid"/>
                 </a:ln>
-                <a:solidFill>
-                  <a:schemeClr val="accent2"/>
-                </a:solidFill>
               </a:rPr>
             </a:br>
             <a:endParaRPr lang="en-US" sz="3000" dirty="0">
@@ -17047,7 +17138,7 @@
           </a:xfrm>
         </p:spPr>
         <p:txBody>
-          <a:bodyPr>
+          <a:bodyPr vert="horz" lIns="91440" tIns="45720" rIns="91440" bIns="45720" anchor="t">
             <a:normAutofit/>
           </a:bodyPr>
           <a:lstStyle/>
@@ -17080,7 +17171,11 @@
               <a:buNone/>
             </a:pPr>
             <a:r>
-              <a:rPr lang="en-US" sz="3000" b="1" dirty="0"/>
+              <a:rPr lang="en-US" sz="3000" b="1" dirty="0">
+                <a:latin typeface="Arial"/>
+                <a:ea typeface="Tahoma"/>
+                <a:cs typeface="Arial"/>
+              </a:rPr>
               <a:t>Lab 1: Design your register file</a:t>
             </a:r>
           </a:p>
@@ -17134,13 +17229,20 @@
         </p:nvSpPr>
         <p:spPr/>
         <p:txBody>
-          <a:bodyPr/>
+          <a:bodyPr vert="horz" lIns="91440" tIns="45720" rIns="91440" bIns="45720" anchor="b" anchorCtr="0">
+            <a:normAutofit/>
+          </a:bodyPr>
           <a:lstStyle/>
           <a:p>
             <a:r>
-              <a:rPr lang="en-US" dirty="0"/>
-              <a:t>Goals of Lab 1</a:t>
-            </a:r>
+              <a:rPr lang="en-US" dirty="0">
+                <a:latin typeface="Arial"/>
+                <a:ea typeface="Tahoma"/>
+                <a:cs typeface="Arial"/>
+              </a:rPr>
+              <a:t>Goal of Lab 1</a:t>
+            </a:r>
+            <a:endParaRPr lang="en-US" dirty="0"/>
           </a:p>
         </p:txBody>
       </p:sp>
@@ -17162,15 +17264,28 @@
         </p:nvSpPr>
         <p:spPr/>
         <p:txBody>
-          <a:bodyPr/>
+          <a:bodyPr vert="horz" lIns="91440" tIns="45720" rIns="91440" bIns="45720" anchor="t">
+            <a:normAutofit/>
+          </a:bodyPr>
           <a:lstStyle/>
           <a:p>
-            <a:r>
-              <a:rPr lang="en-US" sz="2000" dirty="0"/>
+            <a:pPr marL="205105" indent="-205105"/>
+            <a:r>
+              <a:rPr lang="en-US" sz="2000" dirty="0">
+                <a:latin typeface="Arial"/>
+                <a:ea typeface="Tahoma"/>
+                <a:cs typeface="Arial"/>
+              </a:rPr>
               <a:t>The objective of Lab 1 is to design a register file</a:t>
             </a:r>
-          </a:p>
-          <a:p>
+            <a:endParaRPr lang="en-US" dirty="0">
+              <a:latin typeface="Arial"/>
+              <a:ea typeface="Tahoma"/>
+              <a:cs typeface="Arial"/>
+            </a:endParaRPr>
+          </a:p>
+          <a:p>
+            <a:pPr marL="205105" indent="-205105"/>
             <a:endParaRPr lang="en-US" sz="2000" dirty="0"/>
           </a:p>
           <a:p>
@@ -17180,33 +17295,34 @@
             <a:endParaRPr lang="en-US" sz="2000" dirty="0"/>
           </a:p>
           <a:p>
+            <a:pPr marL="205105" indent="-205105"/>
             <a:r>
               <a:rPr lang="en-US" sz="2000" dirty="0"/>
-              <a:t>After this Lab, you need to make sure you</a:t>
-            </a:r>
-          </a:p>
-          <a:p>
-            <a:pPr marL="662925" lvl="1" indent="-457200">
+              <a:t>In this Lab, you will do</a:t>
+            </a:r>
+          </a:p>
+          <a:p>
+            <a:pPr marL="662305" lvl="1" indent="-457200">
               <a:buFont typeface="+mj-lt"/>
               <a:buAutoNum type="arabicPeriod"/>
             </a:pPr>
             <a:r>
               <a:rPr lang="en-US" dirty="0"/>
-              <a:t>Implemented your register file</a:t>
-            </a:r>
-          </a:p>
-          <a:p>
-            <a:pPr marL="662925" lvl="1" indent="-457200">
+              <a:t>Implement your register file</a:t>
+            </a:r>
+          </a:p>
+          <a:p>
+            <a:pPr marL="662305" lvl="1" indent="-457200">
               <a:buFont typeface="+mj-lt"/>
               <a:buAutoNum type="arabicPeriod"/>
             </a:pPr>
             <a:r>
               <a:rPr lang="en-US" altLang="ko-KR" dirty="0"/>
-              <a:t>Validated your register file with the provided test bench</a:t>
-            </a:r>
-          </a:p>
-          <a:p>
-            <a:pPr marL="205725" lvl="1" indent="0">
+              <a:t>Validate your register file with the provided testbench</a:t>
+            </a:r>
+          </a:p>
+          <a:p>
+            <a:pPr marL="205105" lvl="1" indent="0">
               <a:buNone/>
             </a:pPr>
             <a:endParaRPr lang="en-US" dirty="0"/>
@@ -20380,8 +20496,8 @@
         </p:blipFill>
         <p:spPr>
           <a:xfrm>
-            <a:off x="2541864" y="1516284"/>
-            <a:ext cx="4060271" cy="4942785"/>
+            <a:off x="2677429" y="1621082"/>
+            <a:ext cx="3785698" cy="4608533"/>
           </a:xfrm>
           <a:prstGeom prst="rect">
             <a:avLst/>
@@ -20478,20 +20594,29 @@
           <a:p>
             <a:pPr lvl="1"/>
             <a:r>
-              <a:rPr lang="en-US" sz="1600" dirty="0"/>
+              <a:rPr lang="en-US" sz="1600" dirty="0">
+                <a:latin typeface="Arial" panose="020B0604020202020204" pitchFamily="34" charset="0"/>
+                <a:cs typeface="Arial" panose="020B0604020202020204" pitchFamily="34" charset="0"/>
+              </a:rPr>
               <a:t>RISC processor</a:t>
             </a:r>
           </a:p>
           <a:p>
             <a:pPr lvl="1"/>
             <a:r>
-              <a:rPr lang="en-US" sz="1600" dirty="0"/>
+              <a:rPr lang="en-US" sz="1600" dirty="0">
+                <a:latin typeface="Arial" panose="020B0604020202020204" pitchFamily="34" charset="0"/>
+                <a:cs typeface="Arial" panose="020B0604020202020204" pitchFamily="34" charset="0"/>
+              </a:rPr>
               <a:t>Register file</a:t>
             </a:r>
           </a:p>
           <a:p>
             <a:pPr lvl="1"/>
-            <a:endParaRPr lang="en-US" sz="1600" dirty="0"/>
+            <a:endParaRPr lang="en-US" sz="1600" dirty="0">
+              <a:latin typeface="Arial" panose="020B0604020202020204" pitchFamily="34" charset="0"/>
+              <a:cs typeface="Arial" panose="020B0604020202020204" pitchFamily="34" charset="0"/>
+            </a:endParaRPr>
           </a:p>
           <a:p>
             <a:r>
@@ -20502,44 +20627,65 @@
           <a:p>
             <a:pPr lvl="1"/>
             <a:r>
-              <a:rPr lang="en-US" altLang="ko-KR" sz="1600" dirty="0"/>
+              <a:rPr lang="en-US" altLang="ko-KR" sz="1600" dirty="0">
+                <a:latin typeface="Arial" panose="020B0604020202020204" pitchFamily="34" charset="0"/>
+                <a:cs typeface="Arial" panose="020B0604020202020204" pitchFamily="34" charset="0"/>
+              </a:rPr>
               <a:t>Verilog 101</a:t>
             </a:r>
           </a:p>
           <a:p>
             <a:pPr lvl="1"/>
             <a:r>
-              <a:rPr lang="en-US" altLang="ko-KR" sz="1600" dirty="0"/>
-              <a:t>Example code:  4:2 encoder </a:t>
+              <a:rPr lang="en-US" altLang="ko-KR" sz="1600" dirty="0">
+                <a:latin typeface="Arial" panose="020B0604020202020204" pitchFamily="34" charset="0"/>
+                <a:cs typeface="Arial" panose="020B0604020202020204" pitchFamily="34" charset="0"/>
+              </a:rPr>
+              <a:t>Example code: 4:2 encoder </a:t>
             </a:r>
           </a:p>
           <a:p>
             <a:pPr lvl="1"/>
-            <a:endParaRPr lang="en-US" sz="1600" dirty="0"/>
+            <a:endParaRPr lang="en-US" sz="1600" dirty="0">
+              <a:latin typeface="Arial" panose="020B0604020202020204" pitchFamily="34" charset="0"/>
+              <a:cs typeface="Arial" panose="020B0604020202020204" pitchFamily="34" charset="0"/>
+            </a:endParaRPr>
           </a:p>
           <a:p>
             <a:r>
               <a:rPr lang="en-US" sz="2000" dirty="0"/>
-              <a:t>Register file design</a:t>
+              <a:t>Register File Design</a:t>
             </a:r>
           </a:p>
           <a:p>
             <a:pPr lvl="1"/>
             <a:r>
-              <a:rPr lang="en-US" sz="1600" dirty="0"/>
+              <a:rPr lang="en-US" sz="1600" dirty="0">
+                <a:latin typeface="Arial" panose="020B0604020202020204" pitchFamily="34" charset="0"/>
+                <a:cs typeface="Arial" panose="020B0604020202020204" pitchFamily="34" charset="0"/>
+              </a:rPr>
               <a:t>Specification</a:t>
             </a:r>
           </a:p>
           <a:p>
             <a:pPr lvl="1"/>
             <a:r>
-              <a:rPr lang="en-US" sz="1600" dirty="0"/>
+              <a:rPr lang="en-US" sz="1600" dirty="0">
+                <a:latin typeface="Arial" panose="020B0604020202020204" pitchFamily="34" charset="0"/>
+                <a:cs typeface="Arial" panose="020B0604020202020204" pitchFamily="34" charset="0"/>
+              </a:rPr>
               <a:t>Pseudo code example</a:t>
             </a:r>
             <a:br>
-              <a:rPr lang="en-US" sz="1600" dirty="0"/>
+              <a:rPr lang="en-US" sz="1600" dirty="0">
+                <a:latin typeface="Arial" panose="020B0604020202020204" pitchFamily="34" charset="0"/>
+                <a:cs typeface="Arial" panose="020B0604020202020204" pitchFamily="34" charset="0"/>
+              </a:rPr>
             </a:br>
-            <a:endParaRPr lang="en-US" sz="1600" dirty="0"/>
+            <a:endParaRPr lang="en-US" sz="1600" dirty="0">
+              <a:latin typeface="Arial" panose="020B0604020202020204" pitchFamily="34" charset="0"/>
+              <a:cs typeface="Arial" panose="020B0604020202020204" pitchFamily="34" charset="0"/>
+            </a:endParaRPr>
           </a:p>
           <a:p>
             <a:r>
@@ -20550,8 +20696,11 @@
           <a:p>
             <a:pPr lvl="1"/>
             <a:r>
-              <a:rPr lang="en-US" sz="1600" dirty="0"/>
-              <a:t>Behavior simulation</a:t>
+              <a:rPr lang="en-US" sz="1600" dirty="0">
+                <a:latin typeface="Arial" panose="020B0604020202020204" pitchFamily="34" charset="0"/>
+                <a:cs typeface="Arial" panose="020B0604020202020204" pitchFamily="34" charset="0"/>
+              </a:rPr>
+              <a:t>Behavioral simulation</a:t>
             </a:r>
           </a:p>
         </p:txBody>
@@ -23592,45 +23741,6 @@
           </p:style>
         </p:cxnSp>
       </p:grpSp>
-      <p:sp>
-        <p:nvSpPr>
-          <p:cNvPr id="32" name="TextBox 31">
-            <a:extLst>
-              <a:ext uri="{FF2B5EF4-FFF2-40B4-BE49-F238E27FC236}">
-                <a16:creationId xmlns:a16="http://schemas.microsoft.com/office/drawing/2014/main" id="{608E0613-6A5D-4702-A527-07AF5AFCB9AE}"/>
-              </a:ext>
-            </a:extLst>
-          </p:cNvPr>
-          <p:cNvSpPr txBox="1"/>
-          <p:nvPr/>
-        </p:nvSpPr>
-        <p:spPr>
-          <a:xfrm>
-            <a:off x="3200400" y="3200400"/>
-            <a:ext cx="2743199" cy="369332"/>
-          </a:xfrm>
-          <a:prstGeom prst="rect">
-            <a:avLst/>
-          </a:prstGeom>
-          <a:noFill/>
-        </p:spPr>
-        <p:txBody>
-          <a:bodyPr rot="0" spcFirstLastPara="0" vertOverflow="overflow" horzOverflow="overflow" vert="horz" wrap="square" lIns="91440" tIns="45720" rIns="91440" bIns="45720" numCol="1" spcCol="0" rtlCol="0" fromWordArt="0" anchor="t" anchorCtr="0" forceAA="0" compatLnSpc="1">
-            <a:prstTxWarp prst="textNoShape">
-              <a:avLst/>
-            </a:prstTxWarp>
-            <a:spAutoFit/>
-          </a:bodyPr>
-          <a:lstStyle/>
-          <a:p>
-            <a:pPr algn="l"/>
-            <a:r>
-              <a:rPr lang="en-US" dirty="0"/>
-              <a:t>n</a:t>
-            </a:r>
-          </a:p>
-        </p:txBody>
-      </p:sp>
       <p:sp>
         <p:nvSpPr>
           <p:cNvPr id="20" name="TextBox 19">
@@ -25434,12 +25544,6 @@
 </file>
 
 <file path=customXml/item1.xml><?xml version="1.0" encoding="utf-8"?>
-<p:properties xmlns:p="http://schemas.microsoft.com/office/2006/metadata/properties" xmlns:xsi="http://www.w3.org/2001/XMLSchema-instance" xmlns:pc="http://schemas.microsoft.com/office/infopath/2007/PartnerControls">
-  <documentManagement/>
-</p:properties>
-</file>
-
-<file path=customXml/item2.xml><?xml version="1.0" encoding="utf-8"?>
 <?mso-contentType ?>
 <FormTemplates xmlns="http://schemas.microsoft.com/sharepoint/v3/contenttype/forms">
   <Display>DocumentLibraryForm</Display>
@@ -25448,9 +25552,15 @@
 </FormTemplates>
 </file>
 
+<file path=customXml/item2.xml><?xml version="1.0" encoding="utf-8"?>
+<p:properties xmlns:p="http://schemas.microsoft.com/office/2006/metadata/properties" xmlns:xsi="http://www.w3.org/2001/XMLSchema-instance" xmlns:pc="http://schemas.microsoft.com/office/infopath/2007/PartnerControls">
+  <documentManagement/>
+</p:properties>
+</file>
+
 <file path=customXml/item3.xml><?xml version="1.0" encoding="utf-8"?>
-<ct:contentTypeSchema xmlns:ct="http://schemas.microsoft.com/office/2006/metadata/contentType" xmlns:ma="http://schemas.microsoft.com/office/2006/metadata/properties/metaAttributes" ct:_="" ma:_="" ma:contentTypeName="문서" ma:contentTypeID="0x010100E91C5357CA496E4A8EC808FF99C68DE7" ma:contentTypeVersion="2" ma:contentTypeDescription="새 문서를 만듭니다." ma:contentTypeScope="" ma:versionID="74e17d195518bedb05c414b41ea7dcbd">
-  <xsd:schema xmlns:xsd="http://www.w3.org/2001/XMLSchema" xmlns:xs="http://www.w3.org/2001/XMLSchema" xmlns:p="http://schemas.microsoft.com/office/2006/metadata/properties" xmlns:ns2="5745bd64-e6c8-4ab4-9732-0700d66a3ff1" targetNamespace="http://schemas.microsoft.com/office/2006/metadata/properties" ma:root="true" ma:fieldsID="8c9131d3685e274626e620ec12aaded4" ns2:_="">
+<ct:contentTypeSchema xmlns:ct="http://schemas.microsoft.com/office/2006/metadata/contentType" xmlns:ma="http://schemas.microsoft.com/office/2006/metadata/properties/metaAttributes" ct:_="" ma:_="" ma:contentTypeName="Document" ma:contentTypeID="0x010100E91C5357CA496E4A8EC808FF99C68DE7" ma:contentTypeVersion="2" ma:contentTypeDescription="Create a new document." ma:contentTypeScope="" ma:versionID="7dae0ecea7b1beb9d85ca7caf5bfc685">
+  <xsd:schema xmlns:xsd="http://www.w3.org/2001/XMLSchema" xmlns:xs="http://www.w3.org/2001/XMLSchema" xmlns:p="http://schemas.microsoft.com/office/2006/metadata/properties" xmlns:ns2="5745bd64-e6c8-4ab4-9732-0700d66a3ff1" targetNamespace="http://schemas.microsoft.com/office/2006/metadata/properties" ma:root="true" ma:fieldsID="c61c177c76b41292b2fe1755baf8d09b" ns2:_="">
     <xsd:import namespace="5745bd64-e6c8-4ab4-9732-0700d66a3ff1"/>
     <xsd:element name="properties">
       <xsd:complexType>
@@ -25490,8 +25600,8 @@
         <xsd:element ref="dc:creator" minOccurs="0" maxOccurs="1"/>
         <xsd:element ref="dcterms:created" minOccurs="0" maxOccurs="1"/>
         <xsd:element ref="dc:identifier" minOccurs="0" maxOccurs="1"/>
-        <xsd:element name="contentType" minOccurs="0" maxOccurs="1" type="xsd:string" ma:index="0" ma:displayName="콘텐츠 형식"/>
-        <xsd:element ref="dc:title" minOccurs="0" maxOccurs="1" ma:index="4" ma:displayName="제목"/>
+        <xsd:element name="contentType" minOccurs="0" maxOccurs="1" type="xsd:string" ma:index="0" ma:displayName="Content Type"/>
+        <xsd:element ref="dc:title" minOccurs="0" maxOccurs="1" ma:index="4" ma:displayName="Title"/>
         <xsd:element ref="dc:subject" minOccurs="0" maxOccurs="1"/>
         <xsd:element ref="dc:description" minOccurs="0" maxOccurs="1"/>
         <xsd:element name="keywords" minOccurs="0" maxOccurs="1" type="xsd:string"/>
@@ -25581,15 +25691,6 @@
 </file>
 
 <file path=customXml/itemProps1.xml><?xml version="1.0" encoding="utf-8"?>
-<ds:datastoreItem xmlns:ds="http://schemas.openxmlformats.org/officeDocument/2006/customXml" ds:itemID="{41AB84DD-27EA-43DB-B18D-4E06E675FB04}">
-  <ds:schemaRefs>
-    <ds:schemaRef ds:uri="http://schemas.microsoft.com/office/2006/metadata/properties"/>
-    <ds:schemaRef ds:uri="http://schemas.microsoft.com/office/infopath/2007/PartnerControls"/>
-  </ds:schemaRefs>
-</ds:datastoreItem>
-</file>
-
-<file path=customXml/itemProps2.xml><?xml version="1.0" encoding="utf-8"?>
 <ds:datastoreItem xmlns:ds="http://schemas.openxmlformats.org/officeDocument/2006/customXml" ds:itemID="{3AF89042-7D45-4A12-A2BE-DF1BE19A57F5}">
   <ds:schemaRefs>
     <ds:schemaRef ds:uri="http://schemas.microsoft.com/sharepoint/v3/contenttype/forms"/>
@@ -25597,20 +25698,22 @@
 </ds:datastoreItem>
 </file>
 
-<file path=customXml/itemProps3.xml><?xml version="1.0" encoding="utf-8"?>
-<ds:datastoreItem xmlns:ds="http://schemas.openxmlformats.org/officeDocument/2006/customXml" ds:itemID="{22ADAF8E-F0FA-4A4C-946D-AA2723E4BF31}">
+<file path=customXml/itemProps2.xml><?xml version="1.0" encoding="utf-8"?>
+<ds:datastoreItem xmlns:ds="http://schemas.openxmlformats.org/officeDocument/2006/customXml" ds:itemID="{41AB84DD-27EA-43DB-B18D-4E06E675FB04}">
   <ds:schemaRefs>
-    <ds:schemaRef ds:uri="http://schemas.microsoft.com/office/2006/metadata/contentType"/>
-    <ds:schemaRef ds:uri="http://schemas.microsoft.com/office/2006/metadata/properties/metaAttributes"/>
-    <ds:schemaRef ds:uri="http://www.w3.org/2001/XMLSchema"/>
+    <ds:schemaRef ds:uri="http://purl.org/dc/dcmitype/"/>
+    <ds:schemaRef ds:uri="http://purl.org/dc/elements/1.1/"/>
     <ds:schemaRef ds:uri="http://schemas.microsoft.com/office/2006/metadata/properties"/>
+    <ds:schemaRef ds:uri="http://schemas.openxmlformats.org/package/2006/metadata/core-properties"/>
+    <ds:schemaRef ds:uri="http://schemas.microsoft.com/office/infopath/2007/PartnerControls"/>
+    <ds:schemaRef ds:uri="http://purl.org/dc/terms/"/>
+    <ds:schemaRef ds:uri="http://schemas.microsoft.com/office/2006/documentManagement/types"/>
     <ds:schemaRef ds:uri="5745bd64-e6c8-4ab4-9732-0700d66a3ff1"/>
-    <ds:schemaRef ds:uri="http://schemas.microsoft.com/office/2006/documentManagement/types"/>
-    <ds:schemaRef ds:uri="http://schemas.microsoft.com/office/infopath/2007/PartnerControls"/>
-    <ds:schemaRef ds:uri="http://schemas.openxmlformats.org/package/2006/metadata/core-properties"/>
-    <ds:schemaRef ds:uri="http://purl.org/dc/elements/1.1/"/>
-    <ds:schemaRef ds:uri="http://purl.org/dc/terms/"/>
-    <ds:schemaRef ds:uri="http://schemas.microsoft.com/internal/obd"/>
+    <ds:schemaRef ds:uri="http://www.w3.org/XML/1998/namespace"/>
   </ds:schemaRefs>
 </ds:datastoreItem>
+</file>
+
+<file path=customXml/itemProps3.xml><?xml version="1.0" encoding="utf-8"?>
+<ds:datastoreItem xmlns:ds="http://schemas.openxmlformats.org/officeDocument/2006/customXml" ds:itemID="{7E9C94CB-E200-40D1-9AAE-E228C78564EA}"/>
 </file>
</xml_diff>